<commit_message>
Added skills conceptual diagram to pptx and media and update conceptual article to show diagram. Updated .gitignore to exclude VS folder
</commit_message>
<xml_diff>
--- a/art-source/power-point/bot-skills-art.pptx
+++ b/art-source/power-point/bot-skills-art.pptx
@@ -8,6 +8,7 @@
     <p:sldId id="260" r:id="rId2"/>
     <p:sldId id="261" r:id="rId3"/>
     <p:sldId id="262" r:id="rId4"/>
+    <p:sldId id="264" r:id="rId5"/>
   </p:sldIdLst>
   <p:sldSz cx="12192000" cy="6858000"/>
   <p:notesSz cx="6858000" cy="9144000"/>
@@ -261,7 +262,7 @@
           <a:p>
             <a:fld id="{3F2A07B3-3EA6-4CD6-BCEE-0C1A86BDCBEC}" type="datetimeFigureOut">
               <a:rPr lang="en-US" smtClean="0"/>
-              <a:t>12/20/2019</a:t>
+              <a:t>5/6/2020</a:t>
             </a:fld>
             <a:endParaRPr lang="en-US"/>
           </a:p>
@@ -459,7 +460,7 @@
           <a:p>
             <a:fld id="{3F2A07B3-3EA6-4CD6-BCEE-0C1A86BDCBEC}" type="datetimeFigureOut">
               <a:rPr lang="en-US" smtClean="0"/>
-              <a:t>12/20/2019</a:t>
+              <a:t>5/6/2020</a:t>
             </a:fld>
             <a:endParaRPr lang="en-US"/>
           </a:p>
@@ -667,7 +668,7 @@
           <a:p>
             <a:fld id="{3F2A07B3-3EA6-4CD6-BCEE-0C1A86BDCBEC}" type="datetimeFigureOut">
               <a:rPr lang="en-US" smtClean="0"/>
-              <a:t>12/20/2019</a:t>
+              <a:t>5/6/2020</a:t>
             </a:fld>
             <a:endParaRPr lang="en-US"/>
           </a:p>
@@ -865,7 +866,7 @@
           <a:p>
             <a:fld id="{3F2A07B3-3EA6-4CD6-BCEE-0C1A86BDCBEC}" type="datetimeFigureOut">
               <a:rPr lang="en-US" smtClean="0"/>
-              <a:t>12/20/2019</a:t>
+              <a:t>5/6/2020</a:t>
             </a:fld>
             <a:endParaRPr lang="en-US"/>
           </a:p>
@@ -1140,7 +1141,7 @@
           <a:p>
             <a:fld id="{3F2A07B3-3EA6-4CD6-BCEE-0C1A86BDCBEC}" type="datetimeFigureOut">
               <a:rPr lang="en-US" smtClean="0"/>
-              <a:t>12/20/2019</a:t>
+              <a:t>5/6/2020</a:t>
             </a:fld>
             <a:endParaRPr lang="en-US"/>
           </a:p>
@@ -1405,7 +1406,7 @@
           <a:p>
             <a:fld id="{3F2A07B3-3EA6-4CD6-BCEE-0C1A86BDCBEC}" type="datetimeFigureOut">
               <a:rPr lang="en-US" smtClean="0"/>
-              <a:t>12/20/2019</a:t>
+              <a:t>5/6/2020</a:t>
             </a:fld>
             <a:endParaRPr lang="en-US"/>
           </a:p>
@@ -1817,7 +1818,7 @@
           <a:p>
             <a:fld id="{3F2A07B3-3EA6-4CD6-BCEE-0C1A86BDCBEC}" type="datetimeFigureOut">
               <a:rPr lang="en-US" smtClean="0"/>
-              <a:t>12/20/2019</a:t>
+              <a:t>5/6/2020</a:t>
             </a:fld>
             <a:endParaRPr lang="en-US"/>
           </a:p>
@@ -1958,7 +1959,7 @@
           <a:p>
             <a:fld id="{3F2A07B3-3EA6-4CD6-BCEE-0C1A86BDCBEC}" type="datetimeFigureOut">
               <a:rPr lang="en-US" smtClean="0"/>
-              <a:t>12/20/2019</a:t>
+              <a:t>5/6/2020</a:t>
             </a:fld>
             <a:endParaRPr lang="en-US"/>
           </a:p>
@@ -2071,7 +2072,7 @@
           <a:p>
             <a:fld id="{3F2A07B3-3EA6-4CD6-BCEE-0C1A86BDCBEC}" type="datetimeFigureOut">
               <a:rPr lang="en-US" smtClean="0"/>
-              <a:t>12/20/2019</a:t>
+              <a:t>5/6/2020</a:t>
             </a:fld>
             <a:endParaRPr lang="en-US"/>
           </a:p>
@@ -2382,7 +2383,7 @@
           <a:p>
             <a:fld id="{3F2A07B3-3EA6-4CD6-BCEE-0C1A86BDCBEC}" type="datetimeFigureOut">
               <a:rPr lang="en-US" smtClean="0"/>
-              <a:t>12/20/2019</a:t>
+              <a:t>5/6/2020</a:t>
             </a:fld>
             <a:endParaRPr lang="en-US"/>
           </a:p>
@@ -2670,7 +2671,7 @@
           <a:p>
             <a:fld id="{3F2A07B3-3EA6-4CD6-BCEE-0C1A86BDCBEC}" type="datetimeFigureOut">
               <a:rPr lang="en-US" smtClean="0"/>
-              <a:t>12/20/2019</a:t>
+              <a:t>5/6/2020</a:t>
             </a:fld>
             <a:endParaRPr lang="en-US"/>
           </a:p>
@@ -2911,7 +2912,7 @@
           <a:p>
             <a:fld id="{3F2A07B3-3EA6-4CD6-BCEE-0C1A86BDCBEC}" type="datetimeFigureOut">
               <a:rPr lang="en-US" smtClean="0"/>
-              <a:t>12/20/2019</a:t>
+              <a:t>5/6/2020</a:t>
             </a:fld>
             <a:endParaRPr lang="en-US"/>
           </a:p>
@@ -11274,6 +11275,1184 @@
 </p:sld>
 </file>
 
+<file path=ppt/slides/slide4.xml><?xml version="1.0" encoding="utf-8"?>
+<p:sld xmlns:a="http://schemas.openxmlformats.org/drawingml/2006/main" xmlns:r="http://schemas.openxmlformats.org/officeDocument/2006/relationships" xmlns:p="http://schemas.openxmlformats.org/presentationml/2006/main">
+  <p:cSld>
+    <p:spTree>
+      <p:nvGrpSpPr>
+        <p:cNvPr id="1" name=""/>
+        <p:cNvGrpSpPr/>
+        <p:nvPr/>
+      </p:nvGrpSpPr>
+      <p:grpSpPr>
+        <a:xfrm>
+          <a:off x="0" y="0"/>
+          <a:ext cx="0" cy="0"/>
+          <a:chOff x="0" y="0"/>
+          <a:chExt cx="0" cy="0"/>
+        </a:xfrm>
+      </p:grpSpPr>
+      <p:sp>
+        <p:nvSpPr>
+          <p:cNvPr id="4" name="Rectangle 3">
+            <a:extLst>
+              <a:ext uri="{FF2B5EF4-FFF2-40B4-BE49-F238E27FC236}">
+                <a16:creationId xmlns:a16="http://schemas.microsoft.com/office/drawing/2014/main" id="{DE49B9E9-C578-41A4-93D0-A59E4C9487D2}"/>
+              </a:ext>
+            </a:extLst>
+          </p:cNvPr>
+          <p:cNvSpPr/>
+          <p:nvPr/>
+        </p:nvSpPr>
+        <p:spPr>
+          <a:xfrm>
+            <a:off x="6387359" y="887968"/>
+            <a:ext cx="116505" cy="2541032"/>
+          </a:xfrm>
+          <a:prstGeom prst="rect">
+            <a:avLst/>
+          </a:prstGeom>
+          <a:noFill/>
+          <a:ln w="19050">
+            <a:solidFill>
+              <a:schemeClr val="accent2">
+                <a:lumMod val="75000"/>
+              </a:schemeClr>
+            </a:solidFill>
+          </a:ln>
+        </p:spPr>
+        <p:style>
+          <a:lnRef idx="2">
+            <a:schemeClr val="accent1">
+              <a:shade val="50000"/>
+            </a:schemeClr>
+          </a:lnRef>
+          <a:fillRef idx="1">
+            <a:schemeClr val="accent1"/>
+          </a:fillRef>
+          <a:effectRef idx="0">
+            <a:schemeClr val="accent1"/>
+          </a:effectRef>
+          <a:fontRef idx="minor">
+            <a:schemeClr val="lt1"/>
+          </a:fontRef>
+        </p:style>
+        <p:txBody>
+          <a:bodyPr rtlCol="0" anchor="ctr"/>
+          <a:lstStyle/>
+          <a:p>
+            <a:pPr algn="ctr"/>
+            <a:endParaRPr lang="en-US" sz="1200" dirty="0">
+              <a:latin typeface="Segoe UI" panose="020B0502040204020203" pitchFamily="34" charset="0"/>
+              <a:cs typeface="Segoe UI" panose="020B0502040204020203" pitchFamily="34" charset="0"/>
+            </a:endParaRPr>
+          </a:p>
+        </p:txBody>
+      </p:sp>
+      <p:sp>
+        <p:nvSpPr>
+          <p:cNvPr id="5" name="Arrow: Left-Right 4">
+            <a:extLst>
+              <a:ext uri="{FF2B5EF4-FFF2-40B4-BE49-F238E27FC236}">
+                <a16:creationId xmlns:a16="http://schemas.microsoft.com/office/drawing/2014/main" id="{48AC1297-93FF-47A9-B8B7-B926A73F5015}"/>
+              </a:ext>
+            </a:extLst>
+          </p:cNvPr>
+          <p:cNvSpPr/>
+          <p:nvPr/>
+        </p:nvSpPr>
+        <p:spPr>
+          <a:xfrm>
+            <a:off x="5815860" y="1257300"/>
+            <a:ext cx="1257300" cy="685800"/>
+          </a:xfrm>
+          <a:prstGeom prst="leftRightArrow">
+            <a:avLst/>
+          </a:prstGeom>
+          <a:solidFill>
+            <a:schemeClr val="accent6">
+              <a:lumMod val="75000"/>
+            </a:schemeClr>
+          </a:solidFill>
+          <a:ln>
+            <a:solidFill>
+              <a:schemeClr val="accent6">
+                <a:lumMod val="50000"/>
+              </a:schemeClr>
+            </a:solidFill>
+          </a:ln>
+        </p:spPr>
+        <p:style>
+          <a:lnRef idx="2">
+            <a:schemeClr val="accent1">
+              <a:shade val="50000"/>
+            </a:schemeClr>
+          </a:lnRef>
+          <a:fillRef idx="1">
+            <a:schemeClr val="accent1"/>
+          </a:fillRef>
+          <a:effectRef idx="0">
+            <a:schemeClr val="accent1"/>
+          </a:effectRef>
+          <a:fontRef idx="minor">
+            <a:schemeClr val="lt1"/>
+          </a:fontRef>
+        </p:style>
+        <p:txBody>
+          <a:bodyPr rtlCol="0" anchor="ctr"/>
+          <a:lstStyle/>
+          <a:p>
+            <a:pPr algn="ctr"/>
+            <a:r>
+              <a:rPr lang="en-US" sz="1200" dirty="0">
+                <a:solidFill>
+                  <a:schemeClr val="bg1"/>
+                </a:solidFill>
+                <a:latin typeface="Segoe UI" panose="020B0502040204020203" pitchFamily="34" charset="0"/>
+                <a:cs typeface="Segoe UI" panose="020B0502040204020203" pitchFamily="34" charset="0"/>
+              </a:rPr>
+              <a:t>HTTP</a:t>
+            </a:r>
+          </a:p>
+        </p:txBody>
+      </p:sp>
+      <p:sp>
+        <p:nvSpPr>
+          <p:cNvPr id="43" name="Rectangle 42">
+            <a:extLst>
+              <a:ext uri="{FF2B5EF4-FFF2-40B4-BE49-F238E27FC236}">
+                <a16:creationId xmlns:a16="http://schemas.microsoft.com/office/drawing/2014/main" id="{7BD55327-0BE1-49DA-90E9-6230DA54DEF4}"/>
+              </a:ext>
+            </a:extLst>
+          </p:cNvPr>
+          <p:cNvSpPr/>
+          <p:nvPr/>
+        </p:nvSpPr>
+        <p:spPr>
+          <a:xfrm>
+            <a:off x="3698767" y="914400"/>
+            <a:ext cx="135402" cy="2514600"/>
+          </a:xfrm>
+          <a:prstGeom prst="rect">
+            <a:avLst/>
+          </a:prstGeom>
+          <a:noFill/>
+          <a:ln w="19050">
+            <a:solidFill>
+              <a:schemeClr val="accent2">
+                <a:lumMod val="75000"/>
+              </a:schemeClr>
+            </a:solidFill>
+          </a:ln>
+        </p:spPr>
+        <p:style>
+          <a:lnRef idx="2">
+            <a:schemeClr val="accent1">
+              <a:shade val="50000"/>
+            </a:schemeClr>
+          </a:lnRef>
+          <a:fillRef idx="1">
+            <a:schemeClr val="accent1"/>
+          </a:fillRef>
+          <a:effectRef idx="0">
+            <a:schemeClr val="accent1"/>
+          </a:effectRef>
+          <a:fontRef idx="minor">
+            <a:schemeClr val="lt1"/>
+          </a:fontRef>
+        </p:style>
+        <p:txBody>
+          <a:bodyPr rtlCol="0" anchor="ctr"/>
+          <a:lstStyle/>
+          <a:p>
+            <a:pPr algn="ctr"/>
+            <a:endParaRPr lang="en-US" sz="1200" dirty="0">
+              <a:latin typeface="Segoe UI" panose="020B0502040204020203" pitchFamily="34" charset="0"/>
+              <a:cs typeface="Segoe UI" panose="020B0502040204020203" pitchFamily="34" charset="0"/>
+            </a:endParaRPr>
+          </a:p>
+        </p:txBody>
+      </p:sp>
+      <p:sp>
+        <p:nvSpPr>
+          <p:cNvPr id="12" name="Rectangle: Rounded Corners 11">
+            <a:extLst>
+              <a:ext uri="{FF2B5EF4-FFF2-40B4-BE49-F238E27FC236}">
+                <a16:creationId xmlns:a16="http://schemas.microsoft.com/office/drawing/2014/main" id="{BDD194C5-807E-40B2-9EF7-5F0C8CF922B1}"/>
+              </a:ext>
+            </a:extLst>
+          </p:cNvPr>
+          <p:cNvSpPr/>
+          <p:nvPr/>
+        </p:nvSpPr>
+        <p:spPr>
+          <a:xfrm>
+            <a:off x="1787572" y="1945943"/>
+            <a:ext cx="1371600" cy="457200"/>
+          </a:xfrm>
+          <a:prstGeom prst="roundRect">
+            <a:avLst/>
+          </a:prstGeom>
+          <a:solidFill>
+            <a:schemeClr val="accent5">
+              <a:lumMod val="75000"/>
+            </a:schemeClr>
+          </a:solidFill>
+          <a:ln>
+            <a:solidFill>
+              <a:schemeClr val="accent1">
+                <a:lumMod val="75000"/>
+              </a:schemeClr>
+            </a:solidFill>
+          </a:ln>
+        </p:spPr>
+        <p:style>
+          <a:lnRef idx="2">
+            <a:schemeClr val="accent1">
+              <a:shade val="50000"/>
+            </a:schemeClr>
+          </a:lnRef>
+          <a:fillRef idx="1">
+            <a:schemeClr val="accent1"/>
+          </a:fillRef>
+          <a:effectRef idx="0">
+            <a:schemeClr val="accent1"/>
+          </a:effectRef>
+          <a:fontRef idx="minor">
+            <a:schemeClr val="lt1"/>
+          </a:fontRef>
+        </p:style>
+        <p:txBody>
+          <a:bodyPr rtlCol="0" anchor="ctr"/>
+          <a:lstStyle/>
+          <a:p>
+            <a:pPr algn="ctr"/>
+            <a:r>
+              <a:rPr lang="en-US" sz="1200" dirty="0" err="1">
+                <a:solidFill>
+                  <a:schemeClr val="bg1"/>
+                </a:solidFill>
+                <a:latin typeface="Segoe UI" panose="020B0502040204020203" pitchFamily="34" charset="0"/>
+                <a:cs typeface="Segoe UI" panose="020B0502040204020203" pitchFamily="34" charset="0"/>
+              </a:rPr>
+              <a:t>WebChat</a:t>
+            </a:r>
+            <a:endParaRPr lang="en-US" sz="1200" dirty="0">
+              <a:solidFill>
+                <a:schemeClr val="bg1"/>
+              </a:solidFill>
+              <a:latin typeface="Segoe UI" panose="020B0502040204020203" pitchFamily="34" charset="0"/>
+              <a:cs typeface="Segoe UI" panose="020B0502040204020203" pitchFamily="34" charset="0"/>
+            </a:endParaRPr>
+          </a:p>
+        </p:txBody>
+      </p:sp>
+      <p:sp>
+        <p:nvSpPr>
+          <p:cNvPr id="62" name="TextBox 61">
+            <a:extLst>
+              <a:ext uri="{FF2B5EF4-FFF2-40B4-BE49-F238E27FC236}">
+                <a16:creationId xmlns:a16="http://schemas.microsoft.com/office/drawing/2014/main" id="{495F23FA-94AC-48F7-8469-6912CF3E2801}"/>
+              </a:ext>
+            </a:extLst>
+          </p:cNvPr>
+          <p:cNvSpPr txBox="1"/>
+          <p:nvPr/>
+        </p:nvSpPr>
+        <p:spPr>
+          <a:xfrm>
+            <a:off x="4373764" y="887968"/>
+            <a:ext cx="1623073" cy="369332"/>
+          </a:xfrm>
+          <a:prstGeom prst="rect">
+            <a:avLst/>
+          </a:prstGeom>
+          <a:noFill/>
+        </p:spPr>
+        <p:txBody>
+          <a:bodyPr wrap="none" rtlCol="0">
+            <a:spAutoFit/>
+          </a:bodyPr>
+          <a:lstStyle/>
+          <a:p>
+            <a:r>
+              <a:rPr lang="en-US" dirty="0"/>
+              <a:t>Skill consumers</a:t>
+            </a:r>
+          </a:p>
+        </p:txBody>
+      </p:sp>
+      <p:sp>
+        <p:nvSpPr>
+          <p:cNvPr id="63" name="TextBox 62">
+            <a:extLst>
+              <a:ext uri="{FF2B5EF4-FFF2-40B4-BE49-F238E27FC236}">
+                <a16:creationId xmlns:a16="http://schemas.microsoft.com/office/drawing/2014/main" id="{6C06D849-AF25-4408-BB55-731CCC2FB162}"/>
+              </a:ext>
+            </a:extLst>
+          </p:cNvPr>
+          <p:cNvSpPr txBox="1"/>
+          <p:nvPr/>
+        </p:nvSpPr>
+        <p:spPr>
+          <a:xfrm>
+            <a:off x="7431718" y="887968"/>
+            <a:ext cx="643125" cy="369332"/>
+          </a:xfrm>
+          <a:prstGeom prst="rect">
+            <a:avLst/>
+          </a:prstGeom>
+          <a:noFill/>
+        </p:spPr>
+        <p:txBody>
+          <a:bodyPr wrap="none" rtlCol="0">
+            <a:spAutoFit/>
+          </a:bodyPr>
+          <a:lstStyle/>
+          <a:p>
+            <a:r>
+              <a:rPr lang="en-US" dirty="0"/>
+              <a:t>Skills</a:t>
+            </a:r>
+          </a:p>
+        </p:txBody>
+      </p:sp>
+      <p:sp>
+        <p:nvSpPr>
+          <p:cNvPr id="64" name="TextBox 63">
+            <a:extLst>
+              <a:ext uri="{FF2B5EF4-FFF2-40B4-BE49-F238E27FC236}">
+                <a16:creationId xmlns:a16="http://schemas.microsoft.com/office/drawing/2014/main" id="{39C5D526-55D2-4806-AF19-943160AC86D5}"/>
+              </a:ext>
+            </a:extLst>
+          </p:cNvPr>
+          <p:cNvSpPr txBox="1"/>
+          <p:nvPr/>
+        </p:nvSpPr>
+        <p:spPr>
+          <a:xfrm>
+            <a:off x="2163823" y="887968"/>
+            <a:ext cx="617477" cy="369332"/>
+          </a:xfrm>
+          <a:prstGeom prst="rect">
+            <a:avLst/>
+          </a:prstGeom>
+          <a:noFill/>
+        </p:spPr>
+        <p:txBody>
+          <a:bodyPr wrap="none" rtlCol="0">
+            <a:spAutoFit/>
+          </a:bodyPr>
+          <a:lstStyle/>
+          <a:p>
+            <a:r>
+              <a:rPr lang="en-US" dirty="0"/>
+              <a:t>User</a:t>
+            </a:r>
+          </a:p>
+        </p:txBody>
+      </p:sp>
+      <p:sp>
+        <p:nvSpPr>
+          <p:cNvPr id="37" name="Rectangle 36">
+            <a:extLst>
+              <a:ext uri="{FF2B5EF4-FFF2-40B4-BE49-F238E27FC236}">
+                <a16:creationId xmlns:a16="http://schemas.microsoft.com/office/drawing/2014/main" id="{8D387DD0-4D1A-40B8-A0E0-37D9F6D8BFB8}"/>
+              </a:ext>
+            </a:extLst>
+          </p:cNvPr>
+          <p:cNvSpPr/>
+          <p:nvPr/>
+        </p:nvSpPr>
+        <p:spPr>
+          <a:xfrm>
+            <a:off x="4424964" y="1949925"/>
+            <a:ext cx="1371601" cy="457199"/>
+          </a:xfrm>
+          <a:prstGeom prst="rect">
+            <a:avLst/>
+          </a:prstGeom>
+          <a:solidFill>
+            <a:schemeClr val="accent5">
+              <a:lumMod val="75000"/>
+            </a:schemeClr>
+          </a:solidFill>
+          <a:ln>
+            <a:solidFill>
+              <a:schemeClr val="accent1">
+                <a:lumMod val="75000"/>
+              </a:schemeClr>
+            </a:solidFill>
+          </a:ln>
+        </p:spPr>
+        <p:style>
+          <a:lnRef idx="2">
+            <a:schemeClr val="accent1">
+              <a:shade val="50000"/>
+            </a:schemeClr>
+          </a:lnRef>
+          <a:fillRef idx="1">
+            <a:schemeClr val="accent1"/>
+          </a:fillRef>
+          <a:effectRef idx="0">
+            <a:schemeClr val="accent1"/>
+          </a:effectRef>
+          <a:fontRef idx="minor">
+            <a:schemeClr val="lt1"/>
+          </a:fontRef>
+        </p:style>
+        <p:txBody>
+          <a:bodyPr rtlCol="0" anchor="ctr"/>
+          <a:lstStyle/>
+          <a:p>
+            <a:pPr algn="ctr"/>
+            <a:r>
+              <a:rPr lang="en-US" sz="1200" dirty="0">
+                <a:latin typeface="Segoe UI" panose="020B0502040204020203" pitchFamily="34" charset="0"/>
+                <a:cs typeface="Segoe UI" panose="020B0502040204020203" pitchFamily="34" charset="0"/>
+              </a:rPr>
+              <a:t>Root bot 1</a:t>
+            </a:r>
+          </a:p>
+        </p:txBody>
+      </p:sp>
+      <p:cxnSp>
+        <p:nvCxnSpPr>
+          <p:cNvPr id="40" name="Straight Arrow Connector 39">
+            <a:extLst>
+              <a:ext uri="{FF2B5EF4-FFF2-40B4-BE49-F238E27FC236}">
+                <a16:creationId xmlns:a16="http://schemas.microsoft.com/office/drawing/2014/main" id="{BDD8660E-3B99-4E7F-8AF6-F70283F4605E}"/>
+              </a:ext>
+            </a:extLst>
+          </p:cNvPr>
+          <p:cNvCxnSpPr>
+            <a:cxnSpLocks/>
+            <a:endCxn id="12" idx="3"/>
+          </p:cNvCxnSpPr>
+          <p:nvPr/>
+        </p:nvCxnSpPr>
+        <p:spPr>
+          <a:xfrm flipH="1">
+            <a:off x="3159172" y="2174543"/>
+            <a:ext cx="1257297" cy="0"/>
+          </a:xfrm>
+          <a:prstGeom prst="straightConnector1">
+            <a:avLst/>
+          </a:prstGeom>
+          <a:ln w="12700">
+            <a:solidFill>
+              <a:schemeClr val="accent1">
+                <a:lumMod val="75000"/>
+              </a:schemeClr>
+            </a:solidFill>
+            <a:headEnd type="triangle"/>
+            <a:tailEnd type="triangle"/>
+          </a:ln>
+        </p:spPr>
+        <p:style>
+          <a:lnRef idx="1">
+            <a:schemeClr val="accent1"/>
+          </a:lnRef>
+          <a:fillRef idx="0">
+            <a:schemeClr val="accent1"/>
+          </a:fillRef>
+          <a:effectRef idx="0">
+            <a:schemeClr val="accent1"/>
+          </a:effectRef>
+          <a:fontRef idx="minor">
+            <a:schemeClr val="tx1"/>
+          </a:fontRef>
+        </p:style>
+      </p:cxnSp>
+      <p:sp>
+        <p:nvSpPr>
+          <p:cNvPr id="65" name="Arrow: Left-Right 64">
+            <a:extLst>
+              <a:ext uri="{FF2B5EF4-FFF2-40B4-BE49-F238E27FC236}">
+                <a16:creationId xmlns:a16="http://schemas.microsoft.com/office/drawing/2014/main" id="{9FBC3741-1618-4F32-AE2C-2AE89138C89F}"/>
+              </a:ext>
+            </a:extLst>
+          </p:cNvPr>
+          <p:cNvSpPr/>
+          <p:nvPr/>
+        </p:nvSpPr>
+        <p:spPr>
+          <a:xfrm>
+            <a:off x="3124200" y="1257300"/>
+            <a:ext cx="1257300" cy="685800"/>
+          </a:xfrm>
+          <a:prstGeom prst="leftRightArrow">
+            <a:avLst/>
+          </a:prstGeom>
+          <a:solidFill>
+            <a:schemeClr val="accent6">
+              <a:lumMod val="75000"/>
+            </a:schemeClr>
+          </a:solidFill>
+          <a:ln>
+            <a:solidFill>
+              <a:schemeClr val="accent6">
+                <a:lumMod val="50000"/>
+              </a:schemeClr>
+            </a:solidFill>
+          </a:ln>
+        </p:spPr>
+        <p:style>
+          <a:lnRef idx="2">
+            <a:schemeClr val="accent1">
+              <a:shade val="50000"/>
+            </a:schemeClr>
+          </a:lnRef>
+          <a:fillRef idx="1">
+            <a:schemeClr val="accent1"/>
+          </a:fillRef>
+          <a:effectRef idx="0">
+            <a:schemeClr val="accent1"/>
+          </a:effectRef>
+          <a:fontRef idx="minor">
+            <a:schemeClr val="lt1"/>
+          </a:fontRef>
+        </p:style>
+        <p:txBody>
+          <a:bodyPr rtlCol="0" anchor="ctr"/>
+          <a:lstStyle/>
+          <a:p>
+            <a:pPr algn="ctr"/>
+            <a:r>
+              <a:rPr lang="en-US" sz="1200" dirty="0">
+                <a:solidFill>
+                  <a:schemeClr val="bg1"/>
+                </a:solidFill>
+                <a:latin typeface="Segoe UI" panose="020B0502040204020203" pitchFamily="34" charset="0"/>
+                <a:cs typeface="Segoe UI" panose="020B0502040204020203" pitchFamily="34" charset="0"/>
+              </a:rPr>
+              <a:t>HTTP</a:t>
+            </a:r>
+          </a:p>
+        </p:txBody>
+      </p:sp>
+      <p:cxnSp>
+        <p:nvCxnSpPr>
+          <p:cNvPr id="48" name="Straight Arrow Connector 47">
+            <a:extLst>
+              <a:ext uri="{FF2B5EF4-FFF2-40B4-BE49-F238E27FC236}">
+                <a16:creationId xmlns:a16="http://schemas.microsoft.com/office/drawing/2014/main" id="{8D13BBE3-B115-4990-AF13-C7C0E018D083}"/>
+              </a:ext>
+            </a:extLst>
+          </p:cNvPr>
+          <p:cNvCxnSpPr>
+            <a:cxnSpLocks/>
+          </p:cNvCxnSpPr>
+          <p:nvPr/>
+        </p:nvCxnSpPr>
+        <p:spPr>
+          <a:xfrm flipH="1">
+            <a:off x="5796526" y="2174543"/>
+            <a:ext cx="1257297" cy="0"/>
+          </a:xfrm>
+          <a:prstGeom prst="straightConnector1">
+            <a:avLst/>
+          </a:prstGeom>
+          <a:ln w="12700">
+            <a:solidFill>
+              <a:schemeClr val="accent1">
+                <a:lumMod val="75000"/>
+              </a:schemeClr>
+            </a:solidFill>
+            <a:headEnd type="triangle"/>
+            <a:tailEnd type="triangle"/>
+          </a:ln>
+        </p:spPr>
+        <p:style>
+          <a:lnRef idx="1">
+            <a:schemeClr val="accent1"/>
+          </a:lnRef>
+          <a:fillRef idx="0">
+            <a:schemeClr val="accent1"/>
+          </a:fillRef>
+          <a:effectRef idx="0">
+            <a:schemeClr val="accent1"/>
+          </a:effectRef>
+          <a:fontRef idx="minor">
+            <a:schemeClr val="tx1"/>
+          </a:fontRef>
+        </p:style>
+      </p:cxnSp>
+      <p:cxnSp>
+        <p:nvCxnSpPr>
+          <p:cNvPr id="51" name="Straight Arrow Connector 50">
+            <a:extLst>
+              <a:ext uri="{FF2B5EF4-FFF2-40B4-BE49-F238E27FC236}">
+                <a16:creationId xmlns:a16="http://schemas.microsoft.com/office/drawing/2014/main" id="{E5C26C31-529E-4451-A001-2C4281030EFF}"/>
+              </a:ext>
+            </a:extLst>
+          </p:cNvPr>
+          <p:cNvCxnSpPr>
+            <a:cxnSpLocks/>
+          </p:cNvCxnSpPr>
+          <p:nvPr/>
+        </p:nvCxnSpPr>
+        <p:spPr>
+          <a:xfrm flipH="1" flipV="1">
+            <a:off x="5796528" y="2286000"/>
+            <a:ext cx="1226068" cy="574343"/>
+          </a:xfrm>
+          <a:prstGeom prst="straightConnector1">
+            <a:avLst/>
+          </a:prstGeom>
+          <a:ln w="12700">
+            <a:solidFill>
+              <a:schemeClr val="accent1">
+                <a:lumMod val="75000"/>
+              </a:schemeClr>
+            </a:solidFill>
+            <a:headEnd type="triangle"/>
+            <a:tailEnd type="triangle"/>
+          </a:ln>
+        </p:spPr>
+        <p:style>
+          <a:lnRef idx="1">
+            <a:schemeClr val="accent1"/>
+          </a:lnRef>
+          <a:fillRef idx="0">
+            <a:schemeClr val="accent1"/>
+          </a:fillRef>
+          <a:effectRef idx="0">
+            <a:schemeClr val="accent1"/>
+          </a:effectRef>
+          <a:fontRef idx="minor">
+            <a:schemeClr val="tx1"/>
+          </a:fontRef>
+        </p:style>
+      </p:cxnSp>
+      <p:sp>
+        <p:nvSpPr>
+          <p:cNvPr id="53" name="Rectangle: Rounded Corners 52">
+            <a:extLst>
+              <a:ext uri="{FF2B5EF4-FFF2-40B4-BE49-F238E27FC236}">
+                <a16:creationId xmlns:a16="http://schemas.microsoft.com/office/drawing/2014/main" id="{3D79E76E-D411-4C44-8FA5-52EB4B2F0DE8}"/>
+              </a:ext>
+            </a:extLst>
+          </p:cNvPr>
+          <p:cNvSpPr/>
+          <p:nvPr/>
+        </p:nvSpPr>
+        <p:spPr>
+          <a:xfrm>
+            <a:off x="1795649" y="2739218"/>
+            <a:ext cx="1371600" cy="457200"/>
+          </a:xfrm>
+          <a:prstGeom prst="roundRect">
+            <a:avLst/>
+          </a:prstGeom>
+          <a:solidFill>
+            <a:schemeClr val="bg1">
+              <a:lumMod val="75000"/>
+            </a:schemeClr>
+          </a:solidFill>
+          <a:ln>
+            <a:solidFill>
+              <a:schemeClr val="accent1">
+                <a:lumMod val="75000"/>
+              </a:schemeClr>
+            </a:solidFill>
+          </a:ln>
+        </p:spPr>
+        <p:style>
+          <a:lnRef idx="2">
+            <a:schemeClr val="accent1">
+              <a:shade val="50000"/>
+            </a:schemeClr>
+          </a:lnRef>
+          <a:fillRef idx="1">
+            <a:schemeClr val="accent1"/>
+          </a:fillRef>
+          <a:effectRef idx="0">
+            <a:schemeClr val="accent1"/>
+          </a:effectRef>
+          <a:fontRef idx="minor">
+            <a:schemeClr val="lt1"/>
+          </a:fontRef>
+        </p:style>
+        <p:txBody>
+          <a:bodyPr rtlCol="0" anchor="ctr"/>
+          <a:lstStyle/>
+          <a:p>
+            <a:pPr algn="ctr"/>
+            <a:r>
+              <a:rPr lang="en-US" sz="1200" dirty="0">
+                <a:solidFill>
+                  <a:schemeClr val="bg1"/>
+                </a:solidFill>
+                <a:latin typeface="Segoe UI" panose="020B0502040204020203" pitchFamily="34" charset="0"/>
+                <a:cs typeface="Segoe UI" panose="020B0502040204020203" pitchFamily="34" charset="0"/>
+              </a:rPr>
+              <a:t>Teams</a:t>
+            </a:r>
+          </a:p>
+        </p:txBody>
+      </p:sp>
+      <p:sp>
+        <p:nvSpPr>
+          <p:cNvPr id="57" name="Rectangle 56">
+            <a:extLst>
+              <a:ext uri="{FF2B5EF4-FFF2-40B4-BE49-F238E27FC236}">
+                <a16:creationId xmlns:a16="http://schemas.microsoft.com/office/drawing/2014/main" id="{0BFA133A-7444-457C-8924-AB8D403C1595}"/>
+              </a:ext>
+            </a:extLst>
+          </p:cNvPr>
+          <p:cNvSpPr/>
+          <p:nvPr/>
+        </p:nvSpPr>
+        <p:spPr>
+          <a:xfrm>
+            <a:off x="4433041" y="2743200"/>
+            <a:ext cx="1371601" cy="457199"/>
+          </a:xfrm>
+          <a:prstGeom prst="rect">
+            <a:avLst/>
+          </a:prstGeom>
+          <a:solidFill>
+            <a:schemeClr val="bg1">
+              <a:lumMod val="75000"/>
+            </a:schemeClr>
+          </a:solidFill>
+          <a:ln>
+            <a:solidFill>
+              <a:schemeClr val="accent1">
+                <a:lumMod val="75000"/>
+              </a:schemeClr>
+            </a:solidFill>
+          </a:ln>
+        </p:spPr>
+        <p:style>
+          <a:lnRef idx="2">
+            <a:schemeClr val="accent1">
+              <a:shade val="50000"/>
+            </a:schemeClr>
+          </a:lnRef>
+          <a:fillRef idx="1">
+            <a:schemeClr val="accent1"/>
+          </a:fillRef>
+          <a:effectRef idx="0">
+            <a:schemeClr val="accent1"/>
+          </a:effectRef>
+          <a:fontRef idx="minor">
+            <a:schemeClr val="lt1"/>
+          </a:fontRef>
+        </p:style>
+        <p:txBody>
+          <a:bodyPr rtlCol="0" anchor="ctr"/>
+          <a:lstStyle/>
+          <a:p>
+            <a:pPr algn="ctr"/>
+            <a:r>
+              <a:rPr lang="en-US" sz="1200" dirty="0">
+                <a:latin typeface="Segoe UI" panose="020B0502040204020203" pitchFamily="34" charset="0"/>
+                <a:cs typeface="Segoe UI" panose="020B0502040204020203" pitchFamily="34" charset="0"/>
+              </a:rPr>
+              <a:t>Root bot 2</a:t>
+            </a:r>
+          </a:p>
+        </p:txBody>
+      </p:sp>
+      <p:cxnSp>
+        <p:nvCxnSpPr>
+          <p:cNvPr id="70" name="Straight Arrow Connector 69">
+            <a:extLst>
+              <a:ext uri="{FF2B5EF4-FFF2-40B4-BE49-F238E27FC236}">
+                <a16:creationId xmlns:a16="http://schemas.microsoft.com/office/drawing/2014/main" id="{ADE5AE73-DF06-4FE8-8ED3-9E0E49A7C130}"/>
+              </a:ext>
+            </a:extLst>
+          </p:cNvPr>
+          <p:cNvCxnSpPr>
+            <a:cxnSpLocks/>
+          </p:cNvCxnSpPr>
+          <p:nvPr/>
+        </p:nvCxnSpPr>
+        <p:spPr>
+          <a:xfrm flipH="1">
+            <a:off x="3159172" y="2971800"/>
+            <a:ext cx="1257297" cy="0"/>
+          </a:xfrm>
+          <a:prstGeom prst="straightConnector1">
+            <a:avLst/>
+          </a:prstGeom>
+          <a:ln w="12700">
+            <a:solidFill>
+              <a:schemeClr val="accent1">
+                <a:lumMod val="75000"/>
+              </a:schemeClr>
+            </a:solidFill>
+            <a:headEnd type="triangle"/>
+            <a:tailEnd type="triangle"/>
+          </a:ln>
+        </p:spPr>
+        <p:style>
+          <a:lnRef idx="1">
+            <a:schemeClr val="accent1"/>
+          </a:lnRef>
+          <a:fillRef idx="0">
+            <a:schemeClr val="accent1"/>
+          </a:fillRef>
+          <a:effectRef idx="0">
+            <a:schemeClr val="accent1"/>
+          </a:effectRef>
+          <a:fontRef idx="minor">
+            <a:schemeClr val="tx1"/>
+          </a:fontRef>
+        </p:style>
+      </p:cxnSp>
+      <p:cxnSp>
+        <p:nvCxnSpPr>
+          <p:cNvPr id="71" name="Straight Arrow Connector 70">
+            <a:extLst>
+              <a:ext uri="{FF2B5EF4-FFF2-40B4-BE49-F238E27FC236}">
+                <a16:creationId xmlns:a16="http://schemas.microsoft.com/office/drawing/2014/main" id="{57DA51F0-3987-4061-96B6-C336EBBF55D8}"/>
+              </a:ext>
+            </a:extLst>
+          </p:cNvPr>
+          <p:cNvCxnSpPr>
+            <a:cxnSpLocks/>
+          </p:cNvCxnSpPr>
+          <p:nvPr/>
+        </p:nvCxnSpPr>
+        <p:spPr>
+          <a:xfrm flipH="1">
+            <a:off x="5796526" y="2971800"/>
+            <a:ext cx="1257297" cy="0"/>
+          </a:xfrm>
+          <a:prstGeom prst="straightConnector1">
+            <a:avLst/>
+          </a:prstGeom>
+          <a:ln w="12700">
+            <a:solidFill>
+              <a:schemeClr val="accent1">
+                <a:lumMod val="75000"/>
+              </a:schemeClr>
+            </a:solidFill>
+            <a:headEnd type="triangle"/>
+            <a:tailEnd type="triangle"/>
+          </a:ln>
+        </p:spPr>
+        <p:style>
+          <a:lnRef idx="1">
+            <a:schemeClr val="accent1"/>
+          </a:lnRef>
+          <a:fillRef idx="0">
+            <a:schemeClr val="accent1"/>
+          </a:fillRef>
+          <a:effectRef idx="0">
+            <a:schemeClr val="accent1"/>
+          </a:effectRef>
+          <a:fontRef idx="minor">
+            <a:schemeClr val="tx1"/>
+          </a:fontRef>
+        </p:style>
+      </p:cxnSp>
+      <p:grpSp>
+        <p:nvGrpSpPr>
+          <p:cNvPr id="2" name="Group 1">
+            <a:extLst>
+              <a:ext uri="{FF2B5EF4-FFF2-40B4-BE49-F238E27FC236}">
+                <a16:creationId xmlns:a16="http://schemas.microsoft.com/office/drawing/2014/main" id="{9AEEBFB8-EF7D-4D53-879F-8ED247FDEC8E}"/>
+              </a:ext>
+            </a:extLst>
+          </p:cNvPr>
+          <p:cNvGrpSpPr/>
+          <p:nvPr/>
+        </p:nvGrpSpPr>
+        <p:grpSpPr>
+          <a:xfrm>
+            <a:off x="7022596" y="2646387"/>
+            <a:ext cx="1473141" cy="554013"/>
+            <a:chOff x="7022596" y="2646387"/>
+            <a:chExt cx="1473141" cy="554013"/>
+          </a:xfrm>
+        </p:grpSpPr>
+        <p:sp>
+          <p:nvSpPr>
+            <p:cNvPr id="50" name="Rectangle 49">
+              <a:extLst>
+                <a:ext uri="{FF2B5EF4-FFF2-40B4-BE49-F238E27FC236}">
+                  <a16:creationId xmlns:a16="http://schemas.microsoft.com/office/drawing/2014/main" id="{E0E4DA57-3944-4210-9EF6-B6A0B14224D9}"/>
+                </a:ext>
+              </a:extLst>
+            </p:cNvPr>
+            <p:cNvSpPr/>
+            <p:nvPr/>
+          </p:nvSpPr>
+          <p:spPr>
+            <a:xfrm>
+              <a:off x="7022596" y="2743200"/>
+              <a:ext cx="1371600" cy="457200"/>
+            </a:xfrm>
+            <a:prstGeom prst="rect">
+              <a:avLst/>
+            </a:prstGeom>
+            <a:solidFill>
+              <a:schemeClr val="accent5">
+                <a:lumMod val="75000"/>
+              </a:schemeClr>
+            </a:solidFill>
+            <a:ln>
+              <a:solidFill>
+                <a:schemeClr val="accent1">
+                  <a:lumMod val="75000"/>
+                </a:schemeClr>
+              </a:solidFill>
+            </a:ln>
+          </p:spPr>
+          <p:style>
+            <a:lnRef idx="2">
+              <a:schemeClr val="accent1">
+                <a:shade val="50000"/>
+              </a:schemeClr>
+            </a:lnRef>
+            <a:fillRef idx="1">
+              <a:schemeClr val="accent1"/>
+            </a:fillRef>
+            <a:effectRef idx="0">
+              <a:schemeClr val="accent1"/>
+            </a:effectRef>
+            <a:fontRef idx="minor">
+              <a:schemeClr val="lt1"/>
+            </a:fontRef>
+          </p:style>
+          <p:txBody>
+            <a:bodyPr rtlCol="0" anchor="ctr"/>
+            <a:lstStyle/>
+            <a:p>
+              <a:pPr algn="ctr"/>
+              <a:r>
+                <a:rPr lang="en-US" sz="1200" dirty="0">
+                  <a:latin typeface="Segoe UI" panose="020B0502040204020203" pitchFamily="34" charset="0"/>
+                  <a:cs typeface="Segoe UI" panose="020B0502040204020203" pitchFamily="34" charset="0"/>
+                </a:rPr>
+                <a:t>Travel Skill bot</a:t>
+              </a:r>
+            </a:p>
+          </p:txBody>
+        </p:sp>
+        <p:pic>
+          <p:nvPicPr>
+            <p:cNvPr id="10" name="Picture 9">
+              <a:extLst>
+                <a:ext uri="{FF2B5EF4-FFF2-40B4-BE49-F238E27FC236}">
+                  <a16:creationId xmlns:a16="http://schemas.microsoft.com/office/drawing/2014/main" id="{1482C14F-E034-463A-B147-254DC245F62E}"/>
+                </a:ext>
+              </a:extLst>
+            </p:cNvPr>
+            <p:cNvPicPr>
+              <a:picLocks noChangeAspect="1"/>
+            </p:cNvPicPr>
+            <p:nvPr/>
+          </p:nvPicPr>
+          <p:blipFill>
+            <a:blip r:embed="rId2"/>
+            <a:stretch>
+              <a:fillRect/>
+            </a:stretch>
+          </p:blipFill>
+          <p:spPr>
+            <a:xfrm>
+              <a:off x="8292582" y="2646387"/>
+              <a:ext cx="203155" cy="237840"/>
+            </a:xfrm>
+            <a:prstGeom prst="rect">
+              <a:avLst/>
+            </a:prstGeom>
+          </p:spPr>
+        </p:pic>
+      </p:grpSp>
+      <p:pic>
+        <p:nvPicPr>
+          <p:cNvPr id="11" name="Picture 10">
+            <a:extLst>
+              <a:ext uri="{FF2B5EF4-FFF2-40B4-BE49-F238E27FC236}">
+                <a16:creationId xmlns:a16="http://schemas.microsoft.com/office/drawing/2014/main" id="{A0BBD618-0006-45C5-BCA9-9B378B8BE641}"/>
+              </a:ext>
+            </a:extLst>
+          </p:cNvPr>
+          <p:cNvPicPr>
+            <a:picLocks noChangeAspect="1"/>
+          </p:cNvPicPr>
+          <p:nvPr/>
+        </p:nvPicPr>
+        <p:blipFill>
+          <a:blip r:embed="rId3"/>
+          <a:stretch>
+            <a:fillRect/>
+          </a:stretch>
+        </p:blipFill>
+        <p:spPr>
+          <a:xfrm>
+            <a:off x="5687482" y="2621364"/>
+            <a:ext cx="218087" cy="243672"/>
+          </a:xfrm>
+          <a:prstGeom prst="rect">
+            <a:avLst/>
+          </a:prstGeom>
+        </p:spPr>
+      </p:pic>
+      <p:grpSp>
+        <p:nvGrpSpPr>
+          <p:cNvPr id="3" name="Group 2">
+            <a:extLst>
+              <a:ext uri="{FF2B5EF4-FFF2-40B4-BE49-F238E27FC236}">
+                <a16:creationId xmlns:a16="http://schemas.microsoft.com/office/drawing/2014/main" id="{835FB174-ED6D-46C2-9443-533D123C76BF}"/>
+              </a:ext>
+            </a:extLst>
+          </p:cNvPr>
+          <p:cNvGrpSpPr/>
+          <p:nvPr/>
+        </p:nvGrpSpPr>
+        <p:grpSpPr>
+          <a:xfrm>
+            <a:off x="7051196" y="1821265"/>
+            <a:ext cx="1483366" cy="581878"/>
+            <a:chOff x="7051196" y="1821265"/>
+            <a:chExt cx="1483366" cy="581878"/>
+          </a:xfrm>
+        </p:grpSpPr>
+        <p:sp>
+          <p:nvSpPr>
+            <p:cNvPr id="17" name="Rectangle 16">
+              <a:extLst>
+                <a:ext uri="{FF2B5EF4-FFF2-40B4-BE49-F238E27FC236}">
+                  <a16:creationId xmlns:a16="http://schemas.microsoft.com/office/drawing/2014/main" id="{40A2D253-6A5A-477E-8CA9-92F096DEC58C}"/>
+                </a:ext>
+              </a:extLst>
+            </p:cNvPr>
+            <p:cNvSpPr/>
+            <p:nvPr/>
+          </p:nvSpPr>
+          <p:spPr>
+            <a:xfrm>
+              <a:off x="7051196" y="1945943"/>
+              <a:ext cx="1371600" cy="457200"/>
+            </a:xfrm>
+            <a:prstGeom prst="rect">
+              <a:avLst/>
+            </a:prstGeom>
+            <a:solidFill>
+              <a:schemeClr val="accent5">
+                <a:lumMod val="75000"/>
+              </a:schemeClr>
+            </a:solidFill>
+            <a:ln>
+              <a:solidFill>
+                <a:schemeClr val="accent1">
+                  <a:lumMod val="75000"/>
+                </a:schemeClr>
+              </a:solidFill>
+            </a:ln>
+          </p:spPr>
+          <p:style>
+            <a:lnRef idx="2">
+              <a:schemeClr val="accent1">
+                <a:shade val="50000"/>
+              </a:schemeClr>
+            </a:lnRef>
+            <a:fillRef idx="1">
+              <a:schemeClr val="accent1"/>
+            </a:fillRef>
+            <a:effectRef idx="0">
+              <a:schemeClr val="accent1"/>
+            </a:effectRef>
+            <a:fontRef idx="minor">
+              <a:schemeClr val="lt1"/>
+            </a:fontRef>
+          </p:style>
+          <p:txBody>
+            <a:bodyPr rtlCol="0" anchor="ctr"/>
+            <a:lstStyle/>
+            <a:p>
+              <a:pPr algn="ctr"/>
+              <a:r>
+                <a:rPr lang="en-US" sz="1200" dirty="0">
+                  <a:latin typeface="Segoe UI" panose="020B0502040204020203" pitchFamily="34" charset="0"/>
+                  <a:cs typeface="Segoe UI" panose="020B0502040204020203" pitchFamily="34" charset="0"/>
+                </a:rPr>
+                <a:t>Weather Skill bot</a:t>
+              </a:r>
+            </a:p>
+          </p:txBody>
+        </p:sp>
+        <p:pic>
+          <p:nvPicPr>
+            <p:cNvPr id="13" name="Picture 12">
+              <a:extLst>
+                <a:ext uri="{FF2B5EF4-FFF2-40B4-BE49-F238E27FC236}">
+                  <a16:creationId xmlns:a16="http://schemas.microsoft.com/office/drawing/2014/main" id="{206508E7-9EF8-42ED-B985-DDC716753419}"/>
+                </a:ext>
+              </a:extLst>
+            </p:cNvPr>
+            <p:cNvPicPr>
+              <a:picLocks noChangeAspect="1"/>
+            </p:cNvPicPr>
+            <p:nvPr/>
+          </p:nvPicPr>
+          <p:blipFill>
+            <a:blip r:embed="rId4"/>
+            <a:stretch>
+              <a:fillRect/>
+            </a:stretch>
+          </p:blipFill>
+          <p:spPr>
+            <a:xfrm>
+              <a:off x="8313045" y="1821265"/>
+              <a:ext cx="221517" cy="243669"/>
+            </a:xfrm>
+            <a:prstGeom prst="rect">
+              <a:avLst/>
+            </a:prstGeom>
+          </p:spPr>
+        </p:pic>
+      </p:grpSp>
+      <p:pic>
+        <p:nvPicPr>
+          <p:cNvPr id="73" name="Picture 72">
+            <a:extLst>
+              <a:ext uri="{FF2B5EF4-FFF2-40B4-BE49-F238E27FC236}">
+                <a16:creationId xmlns:a16="http://schemas.microsoft.com/office/drawing/2014/main" id="{1914D68B-E698-437C-8182-550CB6A6F40B}"/>
+              </a:ext>
+            </a:extLst>
+          </p:cNvPr>
+          <p:cNvPicPr>
+            <a:picLocks noChangeAspect="1"/>
+          </p:cNvPicPr>
+          <p:nvPr/>
+        </p:nvPicPr>
+        <p:blipFill>
+          <a:blip r:embed="rId4"/>
+          <a:stretch>
+            <a:fillRect/>
+          </a:stretch>
+        </p:blipFill>
+        <p:spPr>
+          <a:xfrm>
+            <a:off x="5685766" y="1821265"/>
+            <a:ext cx="221517" cy="243669"/>
+          </a:xfrm>
+          <a:prstGeom prst="rect">
+            <a:avLst/>
+          </a:prstGeom>
+        </p:spPr>
+      </p:pic>
+    </p:spTree>
+    <p:extLst>
+      <p:ext uri="{BB962C8B-B14F-4D97-AF65-F5344CB8AC3E}">
+        <p14:creationId xmlns:p14="http://schemas.microsoft.com/office/powerpoint/2010/main" val="655584391"/>
+      </p:ext>
+    </p:extLst>
+  </p:cSld>
+  <p:clrMapOvr>
+    <a:masterClrMapping/>
+  </p:clrMapOvr>
+</p:sld>
+</file>
+
 <file path=ppt/theme/theme1.xml><?xml version="1.0" encoding="utf-8"?>
 <a:theme xmlns:a="http://schemas.openxmlformats.org/drawingml/2006/main" name="Office Theme">
   <a:themeElements>

</xml_diff>